<commit_message>
Edited Images and created a Poster PDF
</commit_message>
<xml_diff>
--- a/ADSP_review_poster.pptx
+++ b/ADSP_review_poster.pptx
@@ -197,7 +197,7 @@
           <a:p>
             <a:fld id="{54862F2C-DB6C-4012-9203-4A6B221FBE81}" type="datetimeFigureOut">
               <a:rPr lang="en-US" smtClean="0"/>
-              <a:t>2/26/2024</a:t>
+              <a:t>2/27/2024</a:t>
             </a:fld>
             <a:endParaRPr lang="en-US"/>
           </a:p>
@@ -679,7 +679,7 @@
           <a:p>
             <a:fld id="{0E229EAE-66CA-4BFE-9D4A-7A6AF854154E}" type="datetimeFigureOut">
               <a:rPr lang="en-US" smtClean="0"/>
-              <a:t>2/26/2024</a:t>
+              <a:t>2/27/2024</a:t>
             </a:fld>
             <a:endParaRPr lang="en-US"/>
           </a:p>
@@ -849,7 +849,7 @@
           <a:p>
             <a:fld id="{0E229EAE-66CA-4BFE-9D4A-7A6AF854154E}" type="datetimeFigureOut">
               <a:rPr lang="en-US" smtClean="0"/>
-              <a:t>2/26/2024</a:t>
+              <a:t>2/27/2024</a:t>
             </a:fld>
             <a:endParaRPr lang="en-US"/>
           </a:p>
@@ -1029,7 +1029,7 @@
           <a:p>
             <a:fld id="{0E229EAE-66CA-4BFE-9D4A-7A6AF854154E}" type="datetimeFigureOut">
               <a:rPr lang="en-US" smtClean="0"/>
-              <a:t>2/26/2024</a:t>
+              <a:t>2/27/2024</a:t>
             </a:fld>
             <a:endParaRPr lang="en-US"/>
           </a:p>
@@ -1199,7 +1199,7 @@
           <a:p>
             <a:fld id="{0E229EAE-66CA-4BFE-9D4A-7A6AF854154E}" type="datetimeFigureOut">
               <a:rPr lang="en-US" smtClean="0"/>
-              <a:t>2/26/2024</a:t>
+              <a:t>2/27/2024</a:t>
             </a:fld>
             <a:endParaRPr lang="en-US"/>
           </a:p>
@@ -1443,7 +1443,7 @@
           <a:p>
             <a:fld id="{0E229EAE-66CA-4BFE-9D4A-7A6AF854154E}" type="datetimeFigureOut">
               <a:rPr lang="en-US" smtClean="0"/>
-              <a:t>2/26/2024</a:t>
+              <a:t>2/27/2024</a:t>
             </a:fld>
             <a:endParaRPr lang="en-US"/>
           </a:p>
@@ -1675,7 +1675,7 @@
           <a:p>
             <a:fld id="{0E229EAE-66CA-4BFE-9D4A-7A6AF854154E}" type="datetimeFigureOut">
               <a:rPr lang="en-US" smtClean="0"/>
-              <a:t>2/26/2024</a:t>
+              <a:t>2/27/2024</a:t>
             </a:fld>
             <a:endParaRPr lang="en-US"/>
           </a:p>
@@ -2042,7 +2042,7 @@
           <a:p>
             <a:fld id="{0E229EAE-66CA-4BFE-9D4A-7A6AF854154E}" type="datetimeFigureOut">
               <a:rPr lang="en-US" smtClean="0"/>
-              <a:t>2/26/2024</a:t>
+              <a:t>2/27/2024</a:t>
             </a:fld>
             <a:endParaRPr lang="en-US"/>
           </a:p>
@@ -2160,7 +2160,7 @@
           <a:p>
             <a:fld id="{0E229EAE-66CA-4BFE-9D4A-7A6AF854154E}" type="datetimeFigureOut">
               <a:rPr lang="en-US" smtClean="0"/>
-              <a:t>2/26/2024</a:t>
+              <a:t>2/27/2024</a:t>
             </a:fld>
             <a:endParaRPr lang="en-US"/>
           </a:p>
@@ -2255,7 +2255,7 @@
           <a:p>
             <a:fld id="{0E229EAE-66CA-4BFE-9D4A-7A6AF854154E}" type="datetimeFigureOut">
               <a:rPr lang="en-US" smtClean="0"/>
-              <a:t>2/26/2024</a:t>
+              <a:t>2/27/2024</a:t>
             </a:fld>
             <a:endParaRPr lang="en-US"/>
           </a:p>
@@ -2532,7 +2532,7 @@
           <a:p>
             <a:fld id="{0E229EAE-66CA-4BFE-9D4A-7A6AF854154E}" type="datetimeFigureOut">
               <a:rPr lang="en-US" smtClean="0"/>
-              <a:t>2/26/2024</a:t>
+              <a:t>2/27/2024</a:t>
             </a:fld>
             <a:endParaRPr lang="en-US"/>
           </a:p>
@@ -2789,7 +2789,7 @@
           <a:p>
             <a:fld id="{0E229EAE-66CA-4BFE-9D4A-7A6AF854154E}" type="datetimeFigureOut">
               <a:rPr lang="en-US" smtClean="0"/>
-              <a:t>2/26/2024</a:t>
+              <a:t>2/27/2024</a:t>
             </a:fld>
             <a:endParaRPr lang="en-US"/>
           </a:p>
@@ -3002,7 +3002,7 @@
           <a:p>
             <a:fld id="{0E229EAE-66CA-4BFE-9D4A-7A6AF854154E}" type="datetimeFigureOut">
               <a:rPr lang="en-US" smtClean="0"/>
-              <a:t>2/26/2024</a:t>
+              <a:t>2/27/2024</a:t>
             </a:fld>
             <a:endParaRPr lang="en-US"/>
           </a:p>
@@ -3963,7 +3963,7 @@
         <p:spPr>
           <a:xfrm>
             <a:off x="2409657" y="6249204"/>
-            <a:ext cx="26951684" cy="1187848"/>
+            <a:ext cx="12456717" cy="1187848"/>
           </a:xfrm>
           <a:prstGeom prst="round2SameRect">
             <a:avLst/>
@@ -4025,7 +4025,7 @@
         <p:spPr>
           <a:xfrm>
             <a:off x="2409657" y="7475813"/>
-            <a:ext cx="26951684" cy="3970318"/>
+            <a:ext cx="12456717" cy="3108543"/>
           </a:xfrm>
           <a:prstGeom prst="rect">
             <a:avLst/>
@@ -4146,189 +4146,6 @@
               </a:rPr>
               <a:t> of Other/Unknown ancestry.</a:t>
             </a:r>
-          </a:p>
-          <a:p>
-            <a:pPr marL="457200" indent="-457200">
-              <a:buFont typeface="Arial" panose="020B0604020202020204" pitchFamily="34" charset="0"/>
-              <a:buChar char="•"/>
-            </a:pPr>
-            <a:r>
-              <a:rPr lang="en-US" sz="2800" dirty="0">
-                <a:latin typeface="Work Sans" pitchFamily="2" charset="0"/>
-              </a:rPr>
-              <a:t>Each of the </a:t>
-            </a:r>
-            <a:r>
-              <a:rPr lang="en-US" sz="2800" b="1" dirty="0">
-                <a:latin typeface="Work Sans" pitchFamily="2" charset="0"/>
-              </a:rPr>
-              <a:t>362 million genetic variants </a:t>
-            </a:r>
-            <a:r>
-              <a:rPr lang="en-US" sz="2800" dirty="0">
-                <a:latin typeface="Work Sans" pitchFamily="2" charset="0"/>
-              </a:rPr>
-              <a:t>were processed to generate </a:t>
-            </a:r>
-            <a:r>
-              <a:rPr lang="en-US" sz="2800" b="1" dirty="0">
-                <a:latin typeface="Work Sans" pitchFamily="2" charset="0"/>
-              </a:rPr>
-              <a:t>functional annotations </a:t>
-            </a:r>
-            <a:r>
-              <a:rPr lang="en-US" sz="2800" dirty="0">
-                <a:latin typeface="Work Sans" pitchFamily="2" charset="0"/>
-              </a:rPr>
-              <a:t>using the </a:t>
-            </a:r>
-            <a:r>
-              <a:rPr lang="en-US" sz="2800" b="1" dirty="0">
-                <a:latin typeface="Work Sans" pitchFamily="2" charset="0"/>
-              </a:rPr>
-              <a:t>FAVOR database.</a:t>
-            </a:r>
-          </a:p>
-          <a:p>
-            <a:pPr marL="457200" indent="-457200">
-              <a:buFont typeface="Arial" panose="020B0604020202020204" pitchFamily="34" charset="0"/>
-              <a:buChar char="•"/>
-            </a:pPr>
-            <a:r>
-              <a:rPr lang="en-US" sz="2800" dirty="0">
-                <a:latin typeface="Work Sans" pitchFamily="2" charset="0"/>
-              </a:rPr>
-              <a:t>FAVOR integrates data from multiple databases, including </a:t>
-            </a:r>
-            <a:r>
-              <a:rPr lang="en-US" sz="2800" b="1" dirty="0">
-                <a:latin typeface="Work Sans" pitchFamily="2" charset="0"/>
-              </a:rPr>
-              <a:t>CADD v1.5, GENCODE v31, </a:t>
-            </a:r>
-            <a:r>
-              <a:rPr lang="en-US" sz="2800" b="1" dirty="0" err="1">
-                <a:latin typeface="Work Sans" pitchFamily="2" charset="0"/>
-              </a:rPr>
-              <a:t>Annovar</a:t>
-            </a:r>
-            <a:r>
-              <a:rPr lang="en-US" sz="2800" b="1" dirty="0">
-                <a:latin typeface="Work Sans" pitchFamily="2" charset="0"/>
-              </a:rPr>
-              <a:t>, WGSA, </a:t>
-            </a:r>
-            <a:r>
-              <a:rPr lang="en-US" sz="2800" b="1" dirty="0" err="1">
-                <a:latin typeface="Work Sans" pitchFamily="2" charset="0"/>
-              </a:rPr>
-              <a:t>ClinVar</a:t>
-            </a:r>
-            <a:r>
-              <a:rPr lang="en-US" sz="2800" b="1" dirty="0">
-                <a:latin typeface="Work Sans" pitchFamily="2" charset="0"/>
-              </a:rPr>
-              <a:t>, ENCODE, </a:t>
-            </a:r>
-            <a:r>
-              <a:rPr lang="en-US" sz="2800" b="1" dirty="0" err="1">
-                <a:latin typeface="Work Sans" pitchFamily="2" charset="0"/>
-              </a:rPr>
-              <a:t>SnpEff</a:t>
-            </a:r>
-            <a:r>
-              <a:rPr lang="en-US" sz="2800" b="1" dirty="0">
-                <a:latin typeface="Work Sans" pitchFamily="2" charset="0"/>
-              </a:rPr>
-              <a:t>, 1000 Genome, </a:t>
-            </a:r>
-            <a:r>
-              <a:rPr lang="en-US" sz="2800" b="1" dirty="0" err="1">
-                <a:latin typeface="Work Sans" pitchFamily="2" charset="0"/>
-              </a:rPr>
-              <a:t>TOPMed</a:t>
-            </a:r>
-            <a:r>
-              <a:rPr lang="en-US" sz="2800" b="1" dirty="0">
-                <a:latin typeface="Work Sans" pitchFamily="2" charset="0"/>
-              </a:rPr>
-              <a:t> Bravo Freeze 8 and </a:t>
-            </a:r>
-            <a:r>
-              <a:rPr lang="en-US" sz="2800" b="1" dirty="0" err="1">
-                <a:latin typeface="Work Sans" pitchFamily="2" charset="0"/>
-              </a:rPr>
-              <a:t>gnomAD</a:t>
-            </a:r>
-            <a:r>
-              <a:rPr lang="en-US" sz="2800" b="1" dirty="0">
-                <a:latin typeface="Work Sans" pitchFamily="2" charset="0"/>
-              </a:rPr>
-              <a:t> v3.</a:t>
-            </a:r>
-          </a:p>
-          <a:p>
-            <a:pPr marL="457200" indent="-457200">
-              <a:buFont typeface="Arial" panose="020B0604020202020204" pitchFamily="34" charset="0"/>
-              <a:buChar char="•"/>
-            </a:pPr>
-            <a:r>
-              <a:rPr lang="en-US" sz="2800" dirty="0">
-                <a:latin typeface="Work Sans" pitchFamily="2" charset="0"/>
-              </a:rPr>
-              <a:t>FAVOR functional scores are divided into </a:t>
-            </a:r>
-            <a:r>
-              <a:rPr lang="en-US" sz="2800" b="1" dirty="0">
-                <a:latin typeface="Work Sans" pitchFamily="2" charset="0"/>
-              </a:rPr>
-              <a:t>17 groups</a:t>
-            </a:r>
-            <a:r>
-              <a:rPr lang="en-US" sz="2800" dirty="0">
-                <a:latin typeface="Work Sans" pitchFamily="2" charset="0"/>
-              </a:rPr>
-              <a:t>, along with </a:t>
-            </a:r>
-            <a:r>
-              <a:rPr lang="en-US" sz="2800" b="1" dirty="0">
-                <a:latin typeface="Work Sans" pitchFamily="2" charset="0"/>
-              </a:rPr>
-              <a:t>annotation Principal Components (</a:t>
-            </a:r>
-            <a:r>
-              <a:rPr lang="en-US" sz="2800" b="1" dirty="0" err="1">
-                <a:latin typeface="Work Sans" pitchFamily="2" charset="0"/>
-              </a:rPr>
-              <a:t>aPCs</a:t>
-            </a:r>
-            <a:r>
-              <a:rPr lang="en-US" sz="2800" b="1" dirty="0">
-                <a:latin typeface="Work Sans" pitchFamily="2" charset="0"/>
-              </a:rPr>
-              <a:t>)</a:t>
-            </a:r>
-            <a:r>
-              <a:rPr lang="en-US" sz="2800" dirty="0">
-                <a:latin typeface="Work Sans" pitchFamily="2" charset="0"/>
-              </a:rPr>
-              <a:t>, which are the first variant-specific PC calculated from each standardized individual annotation score within these 17 groups</a:t>
-            </a:r>
-            <a:r>
-              <a:rPr lang="en-US" sz="2800" b="1" dirty="0">
-                <a:latin typeface="Work Sans" pitchFamily="2" charset="0"/>
-              </a:rPr>
-              <a:t>.  </a:t>
-            </a:r>
-          </a:p>
-          <a:p>
-            <a:pPr marL="457200" indent="-457200">
-              <a:buFont typeface="Arial" panose="020B0604020202020204" pitchFamily="34" charset="0"/>
-              <a:buChar char="•"/>
-            </a:pPr>
-            <a:endParaRPr lang="en-US" sz="2800" dirty="0">
-              <a:latin typeface="Work Sans" pitchFamily="2" charset="0"/>
-            </a:endParaRPr>
           </a:p>
         </p:txBody>
       </p:sp>
@@ -4636,6 +4453,288 @@
           </a:prstGeom>
         </p:spPr>
       </p:pic>
+      <p:sp>
+        <p:nvSpPr>
+          <p:cNvPr id="2" name="Rectangle: Top Corners Rounded 1">
+            <a:extLst>
+              <a:ext uri="{FF2B5EF4-FFF2-40B4-BE49-F238E27FC236}">
+                <a16:creationId xmlns:a16="http://schemas.microsoft.com/office/drawing/2014/main" id="{4E145EFB-7299-055D-A363-F30BCBF41B1F}"/>
+              </a:ext>
+            </a:extLst>
+          </p:cNvPr>
+          <p:cNvSpPr/>
+          <p:nvPr/>
+        </p:nvSpPr>
+        <p:spPr>
+          <a:xfrm>
+            <a:off x="16484534" y="6124864"/>
+            <a:ext cx="12456717" cy="1187848"/>
+          </a:xfrm>
+          <a:prstGeom prst="round2SameRect">
+            <a:avLst/>
+          </a:prstGeom>
+          <a:solidFill>
+            <a:srgbClr val="74A9CF"/>
+          </a:solidFill>
+          <a:ln>
+            <a:solidFill>
+              <a:schemeClr val="tx1"/>
+            </a:solidFill>
+          </a:ln>
+        </p:spPr>
+        <p:style>
+          <a:lnRef idx="2">
+            <a:schemeClr val="accent1">
+              <a:shade val="15000"/>
+            </a:schemeClr>
+          </a:lnRef>
+          <a:fillRef idx="1">
+            <a:schemeClr val="accent1"/>
+          </a:fillRef>
+          <a:effectRef idx="0">
+            <a:schemeClr val="accent1"/>
+          </a:effectRef>
+          <a:fontRef idx="minor">
+            <a:schemeClr val="lt1"/>
+          </a:fontRef>
+        </p:style>
+        <p:txBody>
+          <a:bodyPr rtlCol="0" anchor="ctr"/>
+          <a:lstStyle/>
+          <a:p>
+            <a:pPr algn="ctr"/>
+            <a:r>
+              <a:rPr lang="en-US" sz="4800" b="1">
+                <a:solidFill>
+                  <a:schemeClr val="tx1"/>
+                </a:solidFill>
+                <a:latin typeface="Work Sans" pitchFamily="2" charset="0"/>
+              </a:rPr>
+              <a:t>FAVOR annotations</a:t>
+            </a:r>
+            <a:endParaRPr lang="en-US" sz="4800" b="1" dirty="0">
+              <a:solidFill>
+                <a:schemeClr val="tx1"/>
+              </a:solidFill>
+              <a:latin typeface="Work Sans" pitchFamily="2" charset="0"/>
+            </a:endParaRPr>
+          </a:p>
+        </p:txBody>
+      </p:sp>
+      <p:sp>
+        <p:nvSpPr>
+          <p:cNvPr id="4" name="TextBox 3">
+            <a:extLst>
+              <a:ext uri="{FF2B5EF4-FFF2-40B4-BE49-F238E27FC236}">
+                <a16:creationId xmlns:a16="http://schemas.microsoft.com/office/drawing/2014/main" id="{8412198A-9506-9C29-0AB4-B159408B4DD1}"/>
+              </a:ext>
+            </a:extLst>
+          </p:cNvPr>
+          <p:cNvSpPr txBox="1"/>
+          <p:nvPr/>
+        </p:nvSpPr>
+        <p:spPr>
+          <a:xfrm>
+            <a:off x="16484533" y="7325938"/>
+            <a:ext cx="12456717" cy="3970318"/>
+          </a:xfrm>
+          <a:prstGeom prst="rect">
+            <a:avLst/>
+          </a:prstGeom>
+          <a:noFill/>
+          <a:ln>
+            <a:solidFill>
+              <a:schemeClr val="tx1">
+                <a:lumMod val="50000"/>
+                <a:lumOff val="50000"/>
+              </a:schemeClr>
+            </a:solidFill>
+          </a:ln>
+        </p:spPr>
+        <p:txBody>
+          <a:bodyPr wrap="square" rtlCol="0">
+            <a:spAutoFit/>
+          </a:bodyPr>
+          <a:lstStyle/>
+          <a:p>
+            <a:pPr marL="457200" indent="-457200">
+              <a:buFont typeface="Arial" panose="020B0604020202020204" pitchFamily="34" charset="0"/>
+              <a:buChar char="•"/>
+            </a:pPr>
+            <a:r>
+              <a:rPr lang="en-US" sz="2800" dirty="0">
+                <a:latin typeface="Work Sans" pitchFamily="2" charset="0"/>
+              </a:rPr>
+              <a:t>Each of the </a:t>
+            </a:r>
+            <a:r>
+              <a:rPr lang="en-US" sz="2800" b="1" dirty="0">
+                <a:latin typeface="Work Sans" pitchFamily="2" charset="0"/>
+              </a:rPr>
+              <a:t>362 million genetic variants </a:t>
+            </a:r>
+            <a:r>
+              <a:rPr lang="en-US" sz="2800" dirty="0">
+                <a:latin typeface="Work Sans" pitchFamily="2" charset="0"/>
+              </a:rPr>
+              <a:t>were processed to generate </a:t>
+            </a:r>
+            <a:r>
+              <a:rPr lang="en-US" sz="2800" b="1" dirty="0">
+                <a:latin typeface="Work Sans" pitchFamily="2" charset="0"/>
+              </a:rPr>
+              <a:t>functional annotations </a:t>
+            </a:r>
+            <a:r>
+              <a:rPr lang="en-US" sz="2800" dirty="0">
+                <a:latin typeface="Work Sans" pitchFamily="2" charset="0"/>
+              </a:rPr>
+              <a:t>using the </a:t>
+            </a:r>
+            <a:r>
+              <a:rPr lang="en-US" sz="2800" b="1" dirty="0">
+                <a:latin typeface="Work Sans" pitchFamily="2" charset="0"/>
+              </a:rPr>
+              <a:t>FAVOR database.</a:t>
+            </a:r>
+          </a:p>
+          <a:p>
+            <a:pPr marL="457200" indent="-457200">
+              <a:buFont typeface="Arial" panose="020B0604020202020204" pitchFamily="34" charset="0"/>
+              <a:buChar char="•"/>
+            </a:pPr>
+            <a:r>
+              <a:rPr lang="en-US" sz="2800" dirty="0">
+                <a:latin typeface="Work Sans" pitchFamily="2" charset="0"/>
+              </a:rPr>
+              <a:t>FAVOR integrates data from multiple databases, including </a:t>
+            </a:r>
+            <a:r>
+              <a:rPr lang="en-US" sz="2800" b="1" dirty="0">
+                <a:latin typeface="Work Sans" pitchFamily="2" charset="0"/>
+              </a:rPr>
+              <a:t>CADD v1.5, GENCODE v31, </a:t>
+            </a:r>
+            <a:r>
+              <a:rPr lang="en-US" sz="2800" b="1" dirty="0" err="1">
+                <a:latin typeface="Work Sans" pitchFamily="2" charset="0"/>
+              </a:rPr>
+              <a:t>Annovar</a:t>
+            </a:r>
+            <a:r>
+              <a:rPr lang="en-US" sz="2800" b="1" dirty="0">
+                <a:latin typeface="Work Sans" pitchFamily="2" charset="0"/>
+              </a:rPr>
+              <a:t>, WGSA, </a:t>
+            </a:r>
+            <a:r>
+              <a:rPr lang="en-US" sz="2800" b="1" dirty="0" err="1">
+                <a:latin typeface="Work Sans" pitchFamily="2" charset="0"/>
+              </a:rPr>
+              <a:t>ClinVar</a:t>
+            </a:r>
+            <a:r>
+              <a:rPr lang="en-US" sz="2800" b="1" dirty="0">
+                <a:latin typeface="Work Sans" pitchFamily="2" charset="0"/>
+              </a:rPr>
+              <a:t>, ENCODE, </a:t>
+            </a:r>
+            <a:r>
+              <a:rPr lang="en-US" sz="2800" b="1" dirty="0" err="1">
+                <a:latin typeface="Work Sans" pitchFamily="2" charset="0"/>
+              </a:rPr>
+              <a:t>SnpEff</a:t>
+            </a:r>
+            <a:r>
+              <a:rPr lang="en-US" sz="2800" b="1" dirty="0">
+                <a:latin typeface="Work Sans" pitchFamily="2" charset="0"/>
+              </a:rPr>
+              <a:t>, 1000 Genome, </a:t>
+            </a:r>
+            <a:r>
+              <a:rPr lang="en-US" sz="2800" b="1" dirty="0" err="1">
+                <a:latin typeface="Work Sans" pitchFamily="2" charset="0"/>
+              </a:rPr>
+              <a:t>TOPMed</a:t>
+            </a:r>
+            <a:r>
+              <a:rPr lang="en-US" sz="2800" b="1" dirty="0">
+                <a:latin typeface="Work Sans" pitchFamily="2" charset="0"/>
+              </a:rPr>
+              <a:t> Bravo Freeze 8 and </a:t>
+            </a:r>
+            <a:r>
+              <a:rPr lang="en-US" sz="2800" b="1" dirty="0" err="1">
+                <a:latin typeface="Work Sans" pitchFamily="2" charset="0"/>
+              </a:rPr>
+              <a:t>gnomAD</a:t>
+            </a:r>
+            <a:r>
+              <a:rPr lang="en-US" sz="2800" b="1" dirty="0">
+                <a:latin typeface="Work Sans" pitchFamily="2" charset="0"/>
+              </a:rPr>
+              <a:t> v3.</a:t>
+            </a:r>
+          </a:p>
+          <a:p>
+            <a:pPr marL="457200" indent="-457200">
+              <a:buFont typeface="Arial" panose="020B0604020202020204" pitchFamily="34" charset="0"/>
+              <a:buChar char="•"/>
+            </a:pPr>
+            <a:r>
+              <a:rPr lang="en-US" sz="2800" dirty="0">
+                <a:latin typeface="Work Sans" pitchFamily="2" charset="0"/>
+              </a:rPr>
+              <a:t>FAVOR functional scores are divided into </a:t>
+            </a:r>
+            <a:r>
+              <a:rPr lang="en-US" sz="2800" b="1" dirty="0">
+                <a:latin typeface="Work Sans" pitchFamily="2" charset="0"/>
+              </a:rPr>
+              <a:t>17 groups</a:t>
+            </a:r>
+            <a:r>
+              <a:rPr lang="en-US" sz="2800" dirty="0">
+                <a:latin typeface="Work Sans" pitchFamily="2" charset="0"/>
+              </a:rPr>
+              <a:t>, along with </a:t>
+            </a:r>
+            <a:r>
+              <a:rPr lang="en-US" sz="2800" b="1" dirty="0">
+                <a:latin typeface="Work Sans" pitchFamily="2" charset="0"/>
+              </a:rPr>
+              <a:t>annotation Principal Components (</a:t>
+            </a:r>
+            <a:r>
+              <a:rPr lang="en-US" sz="2800" b="1" dirty="0" err="1">
+                <a:latin typeface="Work Sans" pitchFamily="2" charset="0"/>
+              </a:rPr>
+              <a:t>aPCs</a:t>
+            </a:r>
+            <a:r>
+              <a:rPr lang="en-US" sz="2800" b="1" dirty="0">
+                <a:latin typeface="Work Sans" pitchFamily="2" charset="0"/>
+              </a:rPr>
+              <a:t>)</a:t>
+            </a:r>
+            <a:r>
+              <a:rPr lang="en-US" sz="2800" dirty="0">
+                <a:latin typeface="Work Sans" pitchFamily="2" charset="0"/>
+              </a:rPr>
+              <a:t>, which are the first variant-specific PC calculated from each standardized individual annotation score within these 17 groups</a:t>
+            </a:r>
+            <a:r>
+              <a:rPr lang="en-US" sz="2800" b="1" dirty="0">
+                <a:latin typeface="Work Sans" pitchFamily="2" charset="0"/>
+              </a:rPr>
+              <a:t>.  </a:t>
+            </a:r>
+            <a:endParaRPr lang="en-US" sz="2800" dirty="0">
+              <a:latin typeface="Work Sans" pitchFamily="2" charset="0"/>
+            </a:endParaRPr>
+          </a:p>
+        </p:txBody>
+      </p:sp>
     </p:spTree>
     <p:extLst>
       <p:ext uri="{BB962C8B-B14F-4D97-AF65-F5344CB8AC3E}">

</xml_diff>